<commit_message>
updated presentation class 5
</commit_message>
<xml_diff>
--- a/docs/presentations/class5/qrps_sose25_class5.pptx
+++ b/docs/presentations/class5/qrps_sose25_class5.pptx
@@ -5849,7 +5849,7 @@
           <a:p>
             <a:fld id="{BA03FF59-5D93-488D-947C-751844FF28DA}" type="datetime1">
               <a:rPr lang="de-DE" smtClean="0"/>
-              <a:t>12.05.2025</a:t>
+              <a:t>13.05.2025</a:t>
             </a:fld>
             <a:endParaRPr/>
           </a:p>
@@ -6018,7 +6018,7 @@
           <a:p>
             <a:fld id="{3D884BD7-E762-4F01-BC6D-4A8AFDBAB7FC}" type="datetime1">
               <a:rPr lang="de-DE" smtClean="0"/>
-              <a:t>12.05.2025</a:t>
+              <a:t>13.05.2025</a:t>
             </a:fld>
             <a:endParaRPr/>
           </a:p>
@@ -6187,7 +6187,7 @@
           <a:p>
             <a:fld id="{FB130FB0-A15F-4444-AEF5-6AC8A5C2C202}" type="datetime1">
               <a:rPr lang="de-DE" smtClean="0"/>
-              <a:t>12.05.2025</a:t>
+              <a:t>13.05.2025</a:t>
             </a:fld>
             <a:endParaRPr/>
           </a:p>
@@ -6394,7 +6394,7 @@
           <a:p>
             <a:fld id="{100E8596-A3AF-4090-AE2C-F8AA2ADA35D6}" type="datetime1">
               <a:rPr lang="de-DE" smtClean="0"/>
-              <a:t>12.05.2025</a:t>
+              <a:t>13.05.2025</a:t>
             </a:fld>
             <a:endParaRPr/>
           </a:p>
@@ -6525,7 +6525,7 @@
           <a:p>
             <a:fld id="{BA7CF57D-0AF1-4AD1-BA04-0D8E954E826E}" type="datetime1">
               <a:rPr lang="de-DE" smtClean="0"/>
-              <a:t>12.05.2025</a:t>
+              <a:t>13.05.2025</a:t>
             </a:fld>
             <a:endParaRPr/>
           </a:p>
@@ -6656,7 +6656,7 @@
           <a:p>
             <a:fld id="{FC663455-ADA0-4BB4-994D-250B46D7D7A2}" type="datetime1">
               <a:rPr lang="de-DE" smtClean="0"/>
-              <a:t>12.05.2025</a:t>
+              <a:t>13.05.2025</a:t>
             </a:fld>
             <a:endParaRPr/>
           </a:p>
@@ -6901,7 +6901,7 @@
           <a:p>
             <a:fld id="{B0B22F5F-CE94-4202-A78D-347488E0CF99}" type="datetime1">
               <a:rPr lang="de-DE" smtClean="0"/>
-              <a:t>12.05.2025</a:t>
+              <a:t>13.05.2025</a:t>
             </a:fld>
             <a:endParaRPr/>
           </a:p>
@@ -7247,7 +7247,7 @@
           <a:p>
             <a:fld id="{8D1DC380-9088-4A85-8EF7-294F7BA0744C}" type="datetime1">
               <a:rPr lang="de-DE" smtClean="0"/>
-              <a:t>12.05.2025</a:t>
+              <a:t>13.05.2025</a:t>
             </a:fld>
             <a:endParaRPr/>
           </a:p>
@@ -7492,7 +7492,7 @@
           <a:p>
             <a:fld id="{B1274C59-4D4B-4547-B279-F628B3F2E044}" type="datetime1">
               <a:rPr lang="de-DE" smtClean="0"/>
-              <a:t>12.05.2025</a:t>
+              <a:t>13.05.2025</a:t>
             </a:fld>
             <a:endParaRPr/>
           </a:p>
@@ -7699,7 +7699,7 @@
           <a:p>
             <a:fld id="{883F6210-4884-4BA7-B840-5D3EDE2C5BAC}" type="datetime1">
               <a:rPr lang="de-DE" smtClean="0"/>
-              <a:t>12.05.2025</a:t>
+              <a:t>13.05.2025</a:t>
             </a:fld>
             <a:endParaRPr/>
           </a:p>
@@ -7982,7 +7982,7 @@
           <a:p>
             <a:fld id="{78AD783B-1FE2-4823-91B8-753B7AE38CD8}" type="datetime1">
               <a:rPr lang="de-DE" smtClean="0"/>
-              <a:t>12.05.2025</a:t>
+              <a:t>13.05.2025</a:t>
             </a:fld>
             <a:endParaRPr/>
           </a:p>
@@ -8341,7 +8341,7 @@
           <a:p>
             <a:fld id="{675E8181-189C-4C73-A115-CF2B0B9B0596}" type="datetime1">
               <a:rPr lang="de-DE" smtClean="0"/>
-              <a:t>12.05.2025</a:t>
+              <a:t>13.05.2025</a:t>
             </a:fld>
             <a:endParaRPr/>
           </a:p>
@@ -8434,7 +8434,7 @@
           <a:p>
             <a:fld id="{2C975012-9C36-4BB2-9B44-B0C7C4BC21D0}" type="datetime1">
               <a:rPr lang="de-DE" smtClean="0"/>
-              <a:t>12.05.2025</a:t>
+              <a:t>13.05.2025</a:t>
             </a:fld>
             <a:endParaRPr/>
           </a:p>
@@ -8603,7 +8603,7 @@
           <a:p>
             <a:fld id="{C8A68F11-CC96-43BB-AC49-206862560384}" type="datetime1">
               <a:rPr lang="de-DE" smtClean="0"/>
-              <a:t>12.05.2025</a:t>
+              <a:t>13.05.2025</a:t>
             </a:fld>
             <a:endParaRPr/>
           </a:p>
@@ -8772,7 +8772,7 @@
           <a:p>
             <a:fld id="{BAA069B0-EB82-4FF2-A37F-DC63568A8F3D}" type="datetime1">
               <a:rPr lang="de-DE" smtClean="0"/>
-              <a:t>12.05.2025</a:t>
+              <a:t>13.05.2025</a:t>
             </a:fld>
             <a:endParaRPr/>
           </a:p>
@@ -8979,7 +8979,7 @@
           <a:p>
             <a:fld id="{70E8CEF6-9029-4B1E-AB3A-F23E6BF86220}" type="datetime1">
               <a:rPr lang="de-DE" smtClean="0"/>
-              <a:t>12.05.2025</a:t>
+              <a:t>13.05.2025</a:t>
             </a:fld>
             <a:endParaRPr/>
           </a:p>
@@ -9110,7 +9110,7 @@
           <a:p>
             <a:fld id="{CDCD7E44-8031-4DA2-82AF-9AE13A1C22F7}" type="datetime1">
               <a:rPr lang="de-DE" smtClean="0"/>
-              <a:t>12.05.2025</a:t>
+              <a:t>13.05.2025</a:t>
             </a:fld>
             <a:endParaRPr/>
           </a:p>
@@ -9342,7 +9342,7 @@
           <a:p>
             <a:fld id="{AD863DE5-5A6E-4835-8283-158D26F03827}" type="datetime1">
               <a:rPr lang="de-DE" smtClean="0"/>
-              <a:t>12.05.2025</a:t>
+              <a:t>13.05.2025</a:t>
             </a:fld>
             <a:endParaRPr/>
           </a:p>
@@ -9587,7 +9587,7 @@
           <a:p>
             <a:fld id="{415D0D12-012E-40B0-BBB1-20D2BC3C2E00}" type="datetime1">
               <a:rPr lang="de-DE" smtClean="0"/>
-              <a:t>12.05.2025</a:t>
+              <a:t>13.05.2025</a:t>
             </a:fld>
             <a:endParaRPr/>
           </a:p>
@@ -9832,7 +9832,7 @@
           <a:p>
             <a:fld id="{BAB7A66E-DB29-4E1E-AC32-D8646A52733B}" type="datetime1">
               <a:rPr lang="de-DE" smtClean="0"/>
-              <a:t>12.05.2025</a:t>
+              <a:t>13.05.2025</a:t>
             </a:fld>
             <a:endParaRPr/>
           </a:p>
@@ -10077,7 +10077,7 @@
           <a:p>
             <a:fld id="{4649BD6C-F71A-4B07-B3F4-7A61E1343B6B}" type="datetime1">
               <a:rPr lang="de-DE" smtClean="0"/>
-              <a:t>12.05.2025</a:t>
+              <a:t>13.05.2025</a:t>
             </a:fld>
             <a:endParaRPr/>
           </a:p>
@@ -10284,7 +10284,7 @@
           <a:p>
             <a:fld id="{2934335A-A540-463E-B24D-A86B564241CB}" type="datetime1">
               <a:rPr lang="de-DE" smtClean="0"/>
-              <a:t>12.05.2025</a:t>
+              <a:t>13.05.2025</a:t>
             </a:fld>
             <a:endParaRPr/>
           </a:p>
@@ -10567,7 +10567,7 @@
           <a:p>
             <a:fld id="{9F9E41B9-D42A-4BAC-A1A2-07675E2EAD51}" type="datetime1">
               <a:rPr lang="de-DE" smtClean="0"/>
-              <a:t>12.05.2025</a:t>
+              <a:t>13.05.2025</a:t>
             </a:fld>
             <a:endParaRPr/>
           </a:p>
@@ -10926,7 +10926,7 @@
           <a:p>
             <a:fld id="{A34D2AD2-E431-43DA-B37A-58C0EB30587F}" type="datetime1">
               <a:rPr lang="de-DE" smtClean="0"/>
-              <a:t>12.05.2025</a:t>
+              <a:t>13.05.2025</a:t>
             </a:fld>
             <a:endParaRPr/>
           </a:p>
@@ -12882,7 +12882,7 @@
               <a:rPr lang="de-DE" sz="900" b="0" strike="noStrike" spc="-1" smtClean="0">
                 <a:latin typeface="Times New Roman"/>
               </a:rPr>
-              <a:t>12.05.2025</a:t>
+              <a:t>13.05.2025</a:t>
             </a:fld>
             <a:endParaRPr lang="en-US" sz="900" b="0" strike="noStrike" spc="-1">
               <a:latin typeface="Times New Roman"/>
@@ -13618,7 +13618,7 @@
               <a:rPr lang="de-DE" sz="900" b="0" strike="noStrike" spc="-1" smtClean="0">
                 <a:latin typeface="Times New Roman"/>
               </a:rPr>
-              <a:t>12.05.2025</a:t>
+              <a:t>13.05.2025</a:t>
             </a:fld>
             <a:endParaRPr lang="en-US" sz="900" b="0" strike="noStrike" spc="-1">
               <a:latin typeface="Times New Roman"/>
@@ -14715,7 +14715,7 @@
                 <a:latin typeface="Segoe UI"/>
                 <a:ea typeface="Verdana"/>
               </a:rPr>
-              <a:t>12.05.2025</a:t>
+              <a:t>13.05.2025</a:t>
             </a:fld>
             <a:endParaRPr lang="en-US" sz="900" b="0" strike="noStrike" spc="-1">
               <a:latin typeface="Times New Roman"/>
@@ -16249,7 +16249,7 @@
                 <a:latin typeface="Segoe UI"/>
                 <a:ea typeface="Verdana"/>
               </a:rPr>
-              <a:t>12.05.2025</a:t>
+              <a:t>13.05.2025</a:t>
             </a:fld>
             <a:endParaRPr lang="en-US" sz="900" b="0" strike="noStrike" spc="-1">
               <a:latin typeface="Times New Roman"/>
@@ -17400,8 +17400,8 @@
           </a:p>
         </p:txBody>
       </p:sp>
-      <mc:AlternateContent xmlns:mc="http://schemas.openxmlformats.org/markup-compatibility/2006" xmlns:a14="http://schemas.microsoft.com/office/drawing/2010/main">
-        <mc:Choice Requires="a14">
+      <mc:AlternateContent xmlns:mc="http://schemas.openxmlformats.org/markup-compatibility/2006">
+        <mc:Choice xmlns:a14="http://schemas.microsoft.com/office/drawing/2010/main" Requires="a14">
           <p:sp>
             <p:nvSpPr>
               <p:cNvPr id="17" name="TextBox 16">
@@ -17515,7 +17515,7 @@
             </p:txBody>
           </p:sp>
         </mc:Choice>
-        <mc:Fallback xmlns="">
+        <mc:Fallback>
           <p:sp>
             <p:nvSpPr>
               <p:cNvPr id="17" name="TextBox 16">
@@ -17743,7 +17743,7 @@
                 <a:latin typeface="Segoe UI"/>
                 <a:ea typeface="Verdana"/>
               </a:rPr>
-              <a:t>12.05.2025</a:t>
+              <a:t>13.05.2025</a:t>
             </a:fld>
             <a:endParaRPr lang="en-US" sz="900" b="0" strike="noStrike" spc="-1">
               <a:latin typeface="Times New Roman"/>
@@ -20273,7 +20273,7 @@
                 <a:latin typeface="Segoe UI"/>
                 <a:ea typeface="Verdana"/>
               </a:rPr>
-              <a:t>12.05.2025</a:t>
+              <a:t>13.05.2025</a:t>
             </a:fld>
             <a:endParaRPr lang="en-US" sz="900" b="0" strike="noStrike" spc="-1">
               <a:latin typeface="Times New Roman"/>
@@ -22519,7 +22519,7 @@
                 <a:latin typeface="Segoe UI"/>
                 <a:ea typeface="Verdana"/>
               </a:rPr>
-              <a:t>12.05.2025</a:t>
+              <a:t>13.05.2025</a:t>
             </a:fld>
             <a:endParaRPr lang="en-US" sz="900" b="0" strike="noStrike" spc="-1">
               <a:latin typeface="Times New Roman"/>
@@ -22951,7 +22951,21 @@
                 <a:latin typeface="Segoe UI" panose="020B0502040204020203" pitchFamily="34" charset="0"/>
                 <a:cs typeface="Segoe UI" panose="020B0502040204020203" pitchFamily="34" charset="0"/>
               </a:rPr>
-              <a:t>when all the other predictors are at their 0, or baseline category</a:t>
+              <a:t>when all the other predictors are at their </a:t>
+            </a:r>
+            <a:r>
+              <a:rPr lang="en-GB" sz="2000" i="1">
+                <a:latin typeface="Segoe UI" panose="020B0502040204020203" pitchFamily="34" charset="0"/>
+                <a:cs typeface="Segoe UI" panose="020B0502040204020203" pitchFamily="34" charset="0"/>
+              </a:rPr>
+              <a:t>0 value </a:t>
+            </a:r>
+            <a:r>
+              <a:rPr lang="en-GB" sz="2000" i="1" dirty="0">
+                <a:latin typeface="Segoe UI" panose="020B0502040204020203" pitchFamily="34" charset="0"/>
+                <a:cs typeface="Segoe UI" panose="020B0502040204020203" pitchFamily="34" charset="0"/>
+              </a:rPr>
+              <a:t>or baseline category</a:t>
             </a:r>
             <a:endParaRPr lang="en-GB" sz="2000" dirty="0">
               <a:latin typeface="Segoe UI" panose="020B0502040204020203" pitchFamily="34" charset="0"/>
@@ -23170,7 +23184,7 @@
           <a:p>
             <a:fld id="{3D884BD7-E762-4F01-BC6D-4A8AFDBAB7FC}" type="datetime1">
               <a:rPr lang="de-DE" smtClean="0"/>
-              <a:t>12.05.2025</a:t>
+              <a:t>13.05.2025</a:t>
             </a:fld>
             <a:endParaRPr lang="de-DE"/>
           </a:p>
@@ -23641,7 +23655,7 @@
                 <a:latin typeface="Segoe UI"/>
                 <a:ea typeface="Verdana"/>
               </a:rPr>
-              <a:t>12.05.2025</a:t>
+              <a:t>13.05.2025</a:t>
             </a:fld>
             <a:endParaRPr lang="en-US" sz="900" b="0" strike="noStrike" spc="-1">
               <a:latin typeface="Times New Roman"/>
@@ -24738,7 +24752,7 @@
                 <a:latin typeface="Segoe UI"/>
                 <a:ea typeface="Verdana"/>
               </a:rPr>
-              <a:t>12.05.2025</a:t>
+              <a:t>13.05.2025</a:t>
             </a:fld>
             <a:endParaRPr lang="en-US" sz="900" b="0" strike="noStrike" spc="-1">
               <a:latin typeface="Times New Roman"/>
@@ -25383,7 +25397,7 @@
                 <a:latin typeface="Segoe UI"/>
                 <a:ea typeface="Verdana"/>
               </a:rPr>
-              <a:t>12.05.2025</a:t>
+              <a:t>13.05.2025</a:t>
             </a:fld>
             <a:endParaRPr lang="en-US" sz="900" b="0" strike="noStrike" spc="-1">
               <a:latin typeface="Times New Roman"/>
@@ -26285,7 +26299,7 @@
                 <a:latin typeface="Segoe UI"/>
                 <a:ea typeface="Verdana"/>
               </a:rPr>
-              <a:t>12.05.2025</a:t>
+              <a:t>13.05.2025</a:t>
             </a:fld>
             <a:endParaRPr lang="en-US" sz="900" b="0" strike="noStrike" spc="-1">
               <a:latin typeface="Times New Roman"/>
@@ -26890,7 +26904,7 @@
                 <a:latin typeface="Segoe UI"/>
                 <a:ea typeface="Verdana"/>
               </a:rPr>
-              <a:t>12.05.2025</a:t>
+              <a:t>13.05.2025</a:t>
             </a:fld>
             <a:endParaRPr lang="en-US" sz="900" b="0" strike="noStrike" spc="-1">
               <a:latin typeface="Times New Roman"/>
@@ -27861,7 +27875,7 @@
                 <a:latin typeface="Segoe UI"/>
                 <a:ea typeface="Verdana"/>
               </a:rPr>
-              <a:t>12.05.2025</a:t>
+              <a:t>13.05.2025</a:t>
             </a:fld>
             <a:endParaRPr lang="en-US" sz="900" b="0" strike="noStrike" spc="-1">
               <a:latin typeface="Times New Roman"/>
@@ -28989,7 +29003,7 @@
                 <a:latin typeface="Segoe UI"/>
                 <a:ea typeface="Verdana"/>
               </a:rPr>
-              <a:t>12.05.2025</a:t>
+              <a:t>13.05.2025</a:t>
             </a:fld>
             <a:endParaRPr lang="en-US" sz="900" b="0" strike="noStrike" spc="-1">
               <a:latin typeface="Times New Roman"/>
@@ -30156,7 +30170,7 @@
                 <a:latin typeface="Segoe UI"/>
                 <a:ea typeface="Verdana"/>
               </a:rPr>
-              <a:t>12.05.2025</a:t>
+              <a:t>13.05.2025</a:t>
             </a:fld>
             <a:endParaRPr lang="en-US" sz="900" b="0" strike="noStrike" spc="-1">
               <a:latin typeface="Times New Roman"/>
@@ -30812,7 +30826,7 @@
                 <a:latin typeface="Segoe UI"/>
                 <a:ea typeface="Verdana"/>
               </a:rPr>
-              <a:t>12.05.2025</a:t>
+              <a:t>13.05.2025</a:t>
             </a:fld>
             <a:endParaRPr lang="en-US" sz="900" b="0" strike="noStrike" spc="-1">
               <a:latin typeface="Times New Roman"/>
@@ -31361,7 +31375,7 @@
                 <a:latin typeface="Segoe UI"/>
                 <a:ea typeface="Verdana"/>
               </a:rPr>
-              <a:t>12.05.2025</a:t>
+              <a:t>13.05.2025</a:t>
             </a:fld>
             <a:endParaRPr lang="en-US" sz="900" b="0" strike="noStrike" spc="-1">
               <a:latin typeface="Times New Roman"/>
@@ -31907,7 +31921,7 @@
           <a:p>
             <a:fld id="{3D884BD7-E762-4F01-BC6D-4A8AFDBAB7FC}" type="datetime1">
               <a:rPr lang="de-DE" smtClean="0"/>
-              <a:t>12.05.2025</a:t>
+              <a:t>13.05.2025</a:t>
             </a:fld>
             <a:endParaRPr lang="de-DE"/>
           </a:p>
@@ -32334,7 +32348,7 @@
                 <a:latin typeface="Segoe UI"/>
                 <a:ea typeface="Verdana"/>
               </a:rPr>
-              <a:t>12.05.2025</a:t>
+              <a:t>13.05.2025</a:t>
             </a:fld>
             <a:endParaRPr lang="en-US" sz="900" b="0" strike="noStrike" spc="-1">
               <a:latin typeface="Times New Roman"/>
@@ -32991,7 +33005,7 @@
           <a:p>
             <a:fld id="{3D884BD7-E762-4F01-BC6D-4A8AFDBAB7FC}" type="datetime1">
               <a:rPr lang="de-DE" smtClean="0"/>
-              <a:t>12.05.2025</a:t>
+              <a:t>13.05.2025</a:t>
             </a:fld>
             <a:endParaRPr lang="de-DE"/>
           </a:p>
@@ -33397,7 +33411,7 @@
                 <a:latin typeface="Segoe UI"/>
                 <a:ea typeface="Verdana"/>
               </a:rPr>
-              <a:t>12.05.2025</a:t>
+              <a:t>13.05.2025</a:t>
             </a:fld>
             <a:endParaRPr lang="en-US" sz="900" b="0" strike="noStrike" spc="-1">
               <a:latin typeface="Times New Roman"/>
@@ -34211,7 +34225,7 @@
                 <a:latin typeface="Segoe UI"/>
                 <a:ea typeface="Verdana"/>
               </a:rPr>
-              <a:t>12.05.2025</a:t>
+              <a:t>13.05.2025</a:t>
             </a:fld>
             <a:endParaRPr lang="en-US" sz="900" b="0" strike="noStrike" spc="-1">
               <a:latin typeface="Times New Roman"/>
@@ -35207,7 +35221,7 @@
           <a:p>
             <a:fld id="{3D884BD7-E762-4F01-BC6D-4A8AFDBAB7FC}" type="datetime1">
               <a:rPr lang="de-DE" smtClean="0"/>
-              <a:t>12.05.2025</a:t>
+              <a:t>13.05.2025</a:t>
             </a:fld>
             <a:endParaRPr lang="de-DE"/>
           </a:p>
@@ -35804,7 +35818,7 @@
                 <a:latin typeface="Segoe UI"/>
                 <a:ea typeface="Verdana"/>
               </a:rPr>
-              <a:t>12.05.2025</a:t>
+              <a:t>13.05.2025</a:t>
             </a:fld>
             <a:endParaRPr lang="en-US" sz="900" b="0" strike="noStrike" spc="-1">
               <a:latin typeface="Times New Roman"/>
@@ -36020,7 +36034,7 @@
                 <a:latin typeface="Segoe UI"/>
                 <a:ea typeface="Verdana"/>
               </a:rPr>
-              <a:t>12.05.2025</a:t>
+              <a:t>13.05.2025</a:t>
             </a:fld>
             <a:endParaRPr lang="en-US" sz="900" b="0" strike="noStrike" spc="-1">
               <a:latin typeface="Times New Roman"/>
@@ -37114,7 +37128,7 @@
                 <a:latin typeface="Segoe UI"/>
                 <a:ea typeface="Verdana"/>
               </a:rPr>
-              <a:t>12.05.2025</a:t>
+              <a:t>13.05.2025</a:t>
             </a:fld>
             <a:endParaRPr lang="en-US" sz="900" b="0" strike="noStrike" spc="-1">
               <a:latin typeface="Times New Roman"/>
@@ -37817,7 +37831,7 @@
           <a:p>
             <a:fld id="{3D884BD7-E762-4F01-BC6D-4A8AFDBAB7FC}" type="datetime1">
               <a:rPr lang="de-DE" smtClean="0"/>
-              <a:t>12.05.2025</a:t>
+              <a:t>13.05.2025</a:t>
             </a:fld>
             <a:endParaRPr lang="de-DE"/>
           </a:p>
@@ -38308,7 +38322,7 @@
                 <a:latin typeface="Segoe UI"/>
                 <a:ea typeface="Verdana"/>
               </a:rPr>
-              <a:t>12.05.2025</a:t>
+              <a:t>13.05.2025</a:t>
             </a:fld>
             <a:endParaRPr lang="en-US" sz="900" b="0" strike="noStrike" spc="-1">
               <a:latin typeface="Times New Roman"/>
@@ -38974,7 +38988,7 @@
                 <a:latin typeface="Segoe UI"/>
                 <a:ea typeface="Verdana"/>
               </a:rPr>
-              <a:t>12.05.2025</a:t>
+              <a:t>13.05.2025</a:t>
             </a:fld>
             <a:endParaRPr lang="en-US" sz="900" b="0" strike="noStrike" spc="-1">
               <a:latin typeface="Times New Roman"/>
@@ -39906,7 +39920,7 @@
                 <a:latin typeface="Segoe UI"/>
                 <a:ea typeface="Verdana"/>
               </a:rPr>
-              <a:t>12.05.2025</a:t>
+              <a:t>13.05.2025</a:t>
             </a:fld>
             <a:endParaRPr lang="en-US" sz="900" b="0" strike="noStrike" spc="-1">
               <a:latin typeface="Times New Roman"/>

</xml_diff>